<commit_message>
study 자료 수정 > 3-way-merge내용 추가
</commit_message>
<xml_diff>
--- a/docs/4. merge.pptx
+++ b/docs/4. merge.pptx
@@ -1486,7 +1486,7 @@
           <a:p>
             <a:fld id="{EFBA5509-D1D1-47CF-BFB7-E1AA9548D41D}" type="datetimeFigureOut">
               <a:rPr lang="ko-KR" altLang="en-US" smtClean="0"/>
-              <a:t>2022-11-26</a:t>
+              <a:t>2022-12-05</a:t>
             </a:fld>
             <a:endParaRPr lang="ko-KR" altLang="en-US"/>
           </a:p>
@@ -4773,7 +4773,7 @@
           <a:p>
             <a:fld id="{2E2D5BC7-3CC9-4CF8-9043-E85E9F2EC4FF}" type="datetimeFigureOut">
               <a:rPr lang="ko-KR" altLang="en-US" smtClean="0"/>
-              <a:t>2022-11-26</a:t>
+              <a:t>2022-12-05</a:t>
             </a:fld>
             <a:endParaRPr lang="ko-KR" altLang="en-US"/>
           </a:p>
@@ -4971,7 +4971,7 @@
           <a:p>
             <a:fld id="{2E2D5BC7-3CC9-4CF8-9043-E85E9F2EC4FF}" type="datetimeFigureOut">
               <a:rPr lang="ko-KR" altLang="en-US" smtClean="0"/>
-              <a:t>2022-11-26</a:t>
+              <a:t>2022-12-05</a:t>
             </a:fld>
             <a:endParaRPr lang="ko-KR" altLang="en-US"/>
           </a:p>
@@ -5179,7 +5179,7 @@
           <a:p>
             <a:fld id="{2E2D5BC7-3CC9-4CF8-9043-E85E9F2EC4FF}" type="datetimeFigureOut">
               <a:rPr lang="ko-KR" altLang="en-US" smtClean="0"/>
-              <a:t>2022-11-26</a:t>
+              <a:t>2022-12-05</a:t>
             </a:fld>
             <a:endParaRPr lang="ko-KR" altLang="en-US"/>
           </a:p>
@@ -5377,7 +5377,7 @@
           <a:p>
             <a:fld id="{2E2D5BC7-3CC9-4CF8-9043-E85E9F2EC4FF}" type="datetimeFigureOut">
               <a:rPr lang="ko-KR" altLang="en-US" smtClean="0"/>
-              <a:t>2022-11-26</a:t>
+              <a:t>2022-12-05</a:t>
             </a:fld>
             <a:endParaRPr lang="ko-KR" altLang="en-US"/>
           </a:p>
@@ -5652,7 +5652,7 @@
           <a:p>
             <a:fld id="{2E2D5BC7-3CC9-4CF8-9043-E85E9F2EC4FF}" type="datetimeFigureOut">
               <a:rPr lang="ko-KR" altLang="en-US" smtClean="0"/>
-              <a:t>2022-11-26</a:t>
+              <a:t>2022-12-05</a:t>
             </a:fld>
             <a:endParaRPr lang="ko-KR" altLang="en-US"/>
           </a:p>
@@ -5917,7 +5917,7 @@
           <a:p>
             <a:fld id="{2E2D5BC7-3CC9-4CF8-9043-E85E9F2EC4FF}" type="datetimeFigureOut">
               <a:rPr lang="ko-KR" altLang="en-US" smtClean="0"/>
-              <a:t>2022-11-26</a:t>
+              <a:t>2022-12-05</a:t>
             </a:fld>
             <a:endParaRPr lang="ko-KR" altLang="en-US"/>
           </a:p>
@@ -6329,7 +6329,7 @@
           <a:p>
             <a:fld id="{2E2D5BC7-3CC9-4CF8-9043-E85E9F2EC4FF}" type="datetimeFigureOut">
               <a:rPr lang="ko-KR" altLang="en-US" smtClean="0"/>
-              <a:t>2022-11-26</a:t>
+              <a:t>2022-12-05</a:t>
             </a:fld>
             <a:endParaRPr lang="ko-KR" altLang="en-US"/>
           </a:p>
@@ -6470,7 +6470,7 @@
           <a:p>
             <a:fld id="{2E2D5BC7-3CC9-4CF8-9043-E85E9F2EC4FF}" type="datetimeFigureOut">
               <a:rPr lang="ko-KR" altLang="en-US" smtClean="0"/>
-              <a:t>2022-11-26</a:t>
+              <a:t>2022-12-05</a:t>
             </a:fld>
             <a:endParaRPr lang="ko-KR" altLang="en-US"/>
           </a:p>
@@ -6583,7 +6583,7 @@
           <a:p>
             <a:fld id="{2E2D5BC7-3CC9-4CF8-9043-E85E9F2EC4FF}" type="datetimeFigureOut">
               <a:rPr lang="ko-KR" altLang="en-US" smtClean="0"/>
-              <a:t>2022-11-26</a:t>
+              <a:t>2022-12-05</a:t>
             </a:fld>
             <a:endParaRPr lang="ko-KR" altLang="en-US"/>
           </a:p>
@@ -6894,7 +6894,7 @@
           <a:p>
             <a:fld id="{2E2D5BC7-3CC9-4CF8-9043-E85E9F2EC4FF}" type="datetimeFigureOut">
               <a:rPr lang="ko-KR" altLang="en-US" smtClean="0"/>
-              <a:t>2022-11-26</a:t>
+              <a:t>2022-12-05</a:t>
             </a:fld>
             <a:endParaRPr lang="ko-KR" altLang="en-US"/>
           </a:p>
@@ -7182,7 +7182,7 @@
           <a:p>
             <a:fld id="{2E2D5BC7-3CC9-4CF8-9043-E85E9F2EC4FF}" type="datetimeFigureOut">
               <a:rPr lang="ko-KR" altLang="en-US" smtClean="0"/>
-              <a:t>2022-11-26</a:t>
+              <a:t>2022-12-05</a:t>
             </a:fld>
             <a:endParaRPr lang="ko-KR" altLang="en-US"/>
           </a:p>
@@ -7423,7 +7423,7 @@
           <a:p>
             <a:fld id="{2E2D5BC7-3CC9-4CF8-9043-E85E9F2EC4FF}" type="datetimeFigureOut">
               <a:rPr lang="ko-KR" altLang="en-US" smtClean="0"/>
-              <a:t>2022-11-26</a:t>
+              <a:t>2022-12-05</a:t>
             </a:fld>
             <a:endParaRPr lang="ko-KR" altLang="en-US"/>
           </a:p>
@@ -9191,8 +9191,8 @@
         </p:nvSpPr>
         <p:spPr>
           <a:xfrm>
-            <a:off x="3720729" y="270561"/>
-            <a:ext cx="4750596" cy="584775"/>
+            <a:off x="3379806" y="270561"/>
+            <a:ext cx="5432449" cy="584775"/>
           </a:xfrm>
           <a:prstGeom prst="rect">
             <a:avLst/>
@@ -9216,19 +9216,7 @@
             </a:r>
             <a:r>
               <a:rPr lang="en-US" altLang="ko-KR" sz="3200" dirty="0"/>
-              <a:t>: </a:t>
-            </a:r>
-            <a:r>
-              <a:rPr lang="ko-KR" altLang="en-US" sz="3200" dirty="0"/>
-              <a:t>병합 </a:t>
-            </a:r>
-            <a:r>
-              <a:rPr lang="ko-KR" altLang="en-US" sz="3200" dirty="0" err="1"/>
-              <a:t>커밋</a:t>
-            </a:r>
-            <a:r>
-              <a:rPr lang="en-US" altLang="ko-KR" sz="3200" dirty="0"/>
-              <a:t>]</a:t>
+              <a:t>: 3-way-merge]</a:t>
             </a:r>
           </a:p>
         </p:txBody>
@@ -9470,8 +9458,8 @@
         </p:nvSpPr>
         <p:spPr>
           <a:xfrm>
-            <a:off x="3720729" y="270561"/>
-            <a:ext cx="4750596" cy="584775"/>
+            <a:off x="3379803" y="270561"/>
+            <a:ext cx="5432449" cy="584775"/>
           </a:xfrm>
           <a:prstGeom prst="rect">
             <a:avLst/>
@@ -9495,19 +9483,7 @@
             </a:r>
             <a:r>
               <a:rPr lang="en-US" altLang="ko-KR" sz="3200" dirty="0"/>
-              <a:t>: </a:t>
-            </a:r>
-            <a:r>
-              <a:rPr lang="ko-KR" altLang="en-US" sz="3200" dirty="0"/>
-              <a:t>병합 </a:t>
-            </a:r>
-            <a:r>
-              <a:rPr lang="ko-KR" altLang="en-US" sz="3200" dirty="0" err="1"/>
-              <a:t>커밋</a:t>
-            </a:r>
-            <a:r>
-              <a:rPr lang="en-US" altLang="ko-KR" sz="3200" dirty="0"/>
-              <a:t>]</a:t>
+              <a:t>: 3-way-merge]</a:t>
             </a:r>
           </a:p>
         </p:txBody>
@@ -9526,8 +9502,8 @@
         </p:nvSpPr>
         <p:spPr>
           <a:xfrm>
-            <a:off x="929446" y="5779557"/>
-            <a:ext cx="10333278" cy="369332"/>
+            <a:off x="107912" y="5779557"/>
+            <a:ext cx="11976355" cy="923330"/>
           </a:xfrm>
           <a:prstGeom prst="rect">
             <a:avLst/>
@@ -9568,6 +9544,69 @@
             <a:r>
               <a:rPr lang="ko-KR" altLang="en-US" dirty="0"/>
               <a:t> 내의 변경 내용을 하나로 통합해야 한다</a:t>
+            </a:r>
+            <a:r>
+              <a:rPr lang="en-US" altLang="ko-KR" dirty="0"/>
+              <a:t>.</a:t>
+            </a:r>
+          </a:p>
+          <a:p>
+            <a:pPr algn="ctr"/>
+            <a:endParaRPr lang="en-US" altLang="ko-KR" dirty="0"/>
+          </a:p>
+          <a:p>
+            <a:pPr algn="ctr"/>
+            <a:r>
+              <a:rPr lang="ko-KR" altLang="en-US" dirty="0"/>
+              <a:t>각 </a:t>
+            </a:r>
+            <a:r>
+              <a:rPr lang="ko-KR" altLang="en-US" dirty="0" err="1"/>
+              <a:t>브랜치의</a:t>
+            </a:r>
+            <a:r>
+              <a:rPr lang="ko-KR" altLang="en-US" dirty="0"/>
+              <a:t> 마지막 </a:t>
+            </a:r>
+            <a:r>
+              <a:rPr lang="ko-KR" altLang="en-US" dirty="0" err="1"/>
+              <a:t>커밋</a:t>
+            </a:r>
+            <a:r>
+              <a:rPr lang="ko-KR" altLang="en-US" dirty="0"/>
+              <a:t> 두 개와 공통 </a:t>
+            </a:r>
+            <a:r>
+              <a:rPr lang="ko-KR" altLang="en-US" dirty="0" err="1"/>
+              <a:t>조상까지하여</a:t>
+            </a:r>
+            <a:r>
+              <a:rPr lang="ko-KR" altLang="en-US" dirty="0"/>
+              <a:t> 총 </a:t>
+            </a:r>
+            <a:r>
+              <a:rPr lang="en-US" altLang="ko-KR" dirty="0"/>
+              <a:t>3</a:t>
+            </a:r>
+            <a:r>
+              <a:rPr lang="ko-KR" altLang="en-US" dirty="0"/>
+              <a:t>개의 </a:t>
+            </a:r>
+            <a:r>
+              <a:rPr lang="ko-KR" altLang="en-US" dirty="0" err="1"/>
+              <a:t>커밋을</a:t>
+            </a:r>
+            <a:r>
+              <a:rPr lang="ko-KR" altLang="en-US" dirty="0"/>
+              <a:t> 이용하여 새로운 </a:t>
+            </a:r>
+            <a:r>
+              <a:rPr lang="ko-KR" altLang="en-US" dirty="0" err="1"/>
+              <a:t>커밋을</a:t>
+            </a:r>
+            <a:r>
+              <a:rPr lang="ko-KR" altLang="en-US" dirty="0"/>
+              <a:t> 만들어내는 것이다</a:t>
             </a:r>
             <a:r>
               <a:rPr lang="en-US" altLang="ko-KR" dirty="0"/>
@@ -9702,8 +9741,8 @@
         </p:nvSpPr>
         <p:spPr>
           <a:xfrm>
-            <a:off x="3720722" y="270561"/>
-            <a:ext cx="4750596" cy="584775"/>
+            <a:off x="3379796" y="270561"/>
+            <a:ext cx="5432449" cy="584775"/>
           </a:xfrm>
           <a:prstGeom prst="rect">
             <a:avLst/>
@@ -9727,19 +9766,7 @@
             </a:r>
             <a:r>
               <a:rPr lang="en-US" altLang="ko-KR" sz="3200" dirty="0"/>
-              <a:t>: </a:t>
-            </a:r>
-            <a:r>
-              <a:rPr lang="ko-KR" altLang="en-US" sz="3200" dirty="0"/>
-              <a:t>병합 </a:t>
-            </a:r>
-            <a:r>
-              <a:rPr lang="ko-KR" altLang="en-US" sz="3200" dirty="0" err="1"/>
-              <a:t>커밋</a:t>
-            </a:r>
-            <a:r>
-              <a:rPr lang="en-US" altLang="ko-KR" sz="3200" dirty="0"/>
-              <a:t>]</a:t>
+              <a:t>: 3-way-merge]</a:t>
             </a:r>
           </a:p>
         </p:txBody>
@@ -11105,8 +11132,8 @@
         </p:nvSpPr>
         <p:spPr>
           <a:xfrm>
-            <a:off x="4857569" y="6002664"/>
-            <a:ext cx="2476961" cy="369332"/>
+            <a:off x="4666044" y="6002664"/>
+            <a:ext cx="2860014" cy="369332"/>
           </a:xfrm>
           <a:prstGeom prst="rect">
             <a:avLst/>
@@ -11121,28 +11148,32 @@
           <a:p>
             <a:pPr algn="ctr"/>
             <a:r>
+              <a:rPr lang="en-US" altLang="ko-KR" sz="1800" dirty="0">
+                <a:solidFill>
+                  <a:srgbClr val="FF0000"/>
+                </a:solidFill>
+              </a:rPr>
+              <a:t>3-way-merge</a:t>
+            </a:r>
+            <a:r>
+              <a:rPr lang="ko-KR" altLang="en-US" sz="1800" dirty="0">
+                <a:solidFill>
+                  <a:srgbClr val="FF0000"/>
+                </a:solidFill>
+              </a:rPr>
+              <a:t>이</a:t>
+            </a:r>
+            <a:r>
+              <a:rPr lang="en-US" altLang="ko-KR" sz="1800" dirty="0"/>
+              <a:t> </a:t>
+            </a:r>
+            <a:r>
               <a:rPr lang="ko-KR" altLang="en-US" dirty="0">
                 <a:solidFill>
                   <a:srgbClr val="FF0000"/>
                 </a:solidFill>
               </a:rPr>
-              <a:t>병합 </a:t>
-            </a:r>
-            <a:r>
-              <a:rPr lang="ko-KR" altLang="en-US" dirty="0" err="1">
-                <a:solidFill>
-                  <a:srgbClr val="FF0000"/>
-                </a:solidFill>
-              </a:rPr>
-              <a:t>커밋이</a:t>
-            </a:r>
-            <a:r>
-              <a:rPr lang="ko-KR" altLang="en-US" dirty="0">
-                <a:solidFill>
-                  <a:srgbClr val="FF0000"/>
-                </a:solidFill>
-              </a:rPr>
-              <a:t> 발생한다</a:t>
+              <a:t>발생한다</a:t>
             </a:r>
             <a:r>
               <a:rPr lang="en-US" altLang="ko-KR" dirty="0">
@@ -15287,6 +15318,123 @@
           </a:p>
         </p:txBody>
       </p:sp>
+      <p:sp>
+        <p:nvSpPr>
+          <p:cNvPr id="2" name="TextBox 1">
+            <a:extLst>
+              <a:ext uri="{FF2B5EF4-FFF2-40B4-BE49-F238E27FC236}">
+                <a16:creationId xmlns:a16="http://schemas.microsoft.com/office/drawing/2014/main" id="{168A77BF-43AE-47DB-DC13-ED4406324D11}"/>
+              </a:ext>
+            </a:extLst>
+          </p:cNvPr>
+          <p:cNvSpPr txBox="1"/>
+          <p:nvPr/>
+        </p:nvSpPr>
+        <p:spPr>
+          <a:xfrm>
+            <a:off x="243444" y="3293009"/>
+            <a:ext cx="6851299" cy="646331"/>
+          </a:xfrm>
+          <a:prstGeom prst="rect">
+            <a:avLst/>
+          </a:prstGeom>
+          <a:noFill/>
+        </p:spPr>
+        <p:txBody>
+          <a:bodyPr wrap="none" rtlCol="0">
+            <a:spAutoFit/>
+          </a:bodyPr>
+          <a:lstStyle/>
+          <a:p>
+            <a:r>
+              <a:rPr lang="en-US" altLang="ko-KR" dirty="0" err="1">
+                <a:solidFill>
+                  <a:srgbClr val="222222"/>
+                </a:solidFill>
+                <a:latin typeface="Noto Sans Medium"/>
+              </a:rPr>
+              <a:t>Wonyong</a:t>
+            </a:r>
+            <a:r>
+              <a:rPr lang="en-US" altLang="ko-KR" dirty="0">
+                <a:solidFill>
+                  <a:srgbClr val="222222"/>
+                </a:solidFill>
+                <a:latin typeface="Noto Sans Medium"/>
+              </a:rPr>
+              <a:t> Jang, </a:t>
+            </a:r>
+            <a:r>
+              <a:rPr lang="en-US" altLang="ko-KR" b="0" i="0" dirty="0">
+                <a:solidFill>
+                  <a:srgbClr val="222222"/>
+                </a:solidFill>
+                <a:effectLst/>
+                <a:latin typeface="Noto Sans Medium"/>
+              </a:rPr>
+              <a:t>“</a:t>
+            </a:r>
+            <a:r>
+              <a:rPr lang="en-US" altLang="ko-KR" b="0" i="0" dirty="0">
+                <a:solidFill>
+                  <a:srgbClr val="000C34"/>
+                </a:solidFill>
+                <a:effectLst/>
+                <a:latin typeface="roboto-medium"/>
+              </a:rPr>
+              <a:t>[Git] Merge(3-way merge) </a:t>
+            </a:r>
+            <a:r>
+              <a:rPr lang="ko-KR" altLang="en-US" b="0" i="0" dirty="0">
+                <a:solidFill>
+                  <a:srgbClr val="000C34"/>
+                </a:solidFill>
+                <a:effectLst/>
+                <a:latin typeface="roboto-medium"/>
+              </a:rPr>
+              <a:t>이해하기</a:t>
+            </a:r>
+            <a:r>
+              <a:rPr lang="en-US" altLang="ko-KR" b="0" i="0" dirty="0">
+                <a:solidFill>
+                  <a:srgbClr val="222222"/>
+                </a:solidFill>
+                <a:effectLst/>
+                <a:latin typeface="Noto Sans Medium"/>
+              </a:rPr>
+              <a:t>”</a:t>
+            </a:r>
+            <a:r>
+              <a:rPr lang="en-US" altLang="ko-KR" dirty="0">
+                <a:solidFill>
+                  <a:srgbClr val="222222"/>
+                </a:solidFill>
+                <a:latin typeface="Noto Sans Medium"/>
+              </a:rPr>
+              <a:t>, 2021.02.05.,</a:t>
+            </a:r>
+          </a:p>
+          <a:p>
+            <a:r>
+              <a:rPr lang="en-US" altLang="ko-KR" b="0" i="0" dirty="0">
+                <a:solidFill>
+                  <a:srgbClr val="222222"/>
+                </a:solidFill>
+                <a:effectLst/>
+                <a:latin typeface="Noto Sans Medium"/>
+              </a:rPr>
+              <a:t>&lt;https://wonyong-jang.github.io/git/2021/02/05/Github-Merge.html&gt;.</a:t>
+            </a:r>
+            <a:endParaRPr lang="ko-KR" altLang="en-US" b="0" i="0" dirty="0">
+              <a:solidFill>
+                <a:srgbClr val="222222"/>
+              </a:solidFill>
+              <a:effectLst/>
+              <a:latin typeface="Noto Sans Medium"/>
+            </a:endParaRPr>
+          </a:p>
+        </p:txBody>
+      </p:sp>
     </p:spTree>
     <p:extLst>
       <p:ext uri="{BB962C8B-B14F-4D97-AF65-F5344CB8AC3E}">
@@ -18080,7 +18228,7 @@
         <p:spPr>
           <a:xfrm>
             <a:off x="804585" y="1598154"/>
-            <a:ext cx="3524876" cy="400110"/>
+            <a:ext cx="2075761" cy="400110"/>
           </a:xfrm>
           <a:prstGeom prst="rect">
             <a:avLst/>
@@ -18094,21 +18242,10 @@
           <a:lstStyle/>
           <a:p>
             <a:r>
-              <a:rPr lang="en-US" altLang="ko-KR" sz="2000" dirty="0"/>
-              <a:t>① Merge commit(</a:t>
-            </a:r>
-            <a:r>
-              <a:rPr lang="ko-KR" altLang="en-US" sz="2000" dirty="0"/>
-              <a:t>병합 </a:t>
-            </a:r>
-            <a:r>
-              <a:rPr lang="ko-KR" altLang="en-US" sz="2000" dirty="0" err="1"/>
-              <a:t>커밋</a:t>
-            </a:r>
-            <a:r>
-              <a:rPr lang="en-US" altLang="ko-KR" sz="2000" dirty="0"/>
-              <a:t>)</a:t>
-            </a:r>
+              <a:rPr lang="en-US" altLang="ko-KR" sz="2000"/>
+              <a:t>① 3-way-merge</a:t>
+            </a:r>
+            <a:endParaRPr lang="en-US" altLang="ko-KR" sz="2000" dirty="0"/>
           </a:p>
         </p:txBody>
       </p:sp>

</xml_diff>